<commit_message>
Updated Machine Learning Model
</commit_message>
<xml_diff>
--- a/Machine Learning Model.pptx
+++ b/Machine Learning Model.pptx
@@ -251,7 +251,7 @@
           <a:p>
             <a:fld id="{846CE7D5-CF57-46EF-B807-FDD0502418D4}" type="datetimeFigureOut">
               <a:rPr lang="en-US" smtClean="0"/>
-              <a:t>11/15/2021</a:t>
+              <a:t>12/1/2021</a:t>
             </a:fld>
             <a:endParaRPr lang="en-US"/>
           </a:p>
@@ -421,7 +421,7 @@
           <a:p>
             <a:fld id="{846CE7D5-CF57-46EF-B807-FDD0502418D4}" type="datetimeFigureOut">
               <a:rPr lang="en-US" smtClean="0"/>
-              <a:t>11/15/2021</a:t>
+              <a:t>12/1/2021</a:t>
             </a:fld>
             <a:endParaRPr lang="en-US"/>
           </a:p>
@@ -601,7 +601,7 @@
           <a:p>
             <a:fld id="{846CE7D5-CF57-46EF-B807-FDD0502418D4}" type="datetimeFigureOut">
               <a:rPr lang="en-US" smtClean="0"/>
-              <a:t>11/15/2021</a:t>
+              <a:t>12/1/2021</a:t>
             </a:fld>
             <a:endParaRPr lang="en-US"/>
           </a:p>
@@ -771,7 +771,7 @@
           <a:p>
             <a:fld id="{846CE7D5-CF57-46EF-B807-FDD0502418D4}" type="datetimeFigureOut">
               <a:rPr lang="en-US" smtClean="0"/>
-              <a:t>11/15/2021</a:t>
+              <a:t>12/1/2021</a:t>
             </a:fld>
             <a:endParaRPr lang="en-US"/>
           </a:p>
@@ -1017,7 +1017,7 @@
           <a:p>
             <a:fld id="{846CE7D5-CF57-46EF-B807-FDD0502418D4}" type="datetimeFigureOut">
               <a:rPr lang="en-US" smtClean="0"/>
-              <a:t>11/15/2021</a:t>
+              <a:t>12/1/2021</a:t>
             </a:fld>
             <a:endParaRPr lang="en-US"/>
           </a:p>
@@ -1249,7 +1249,7 @@
           <a:p>
             <a:fld id="{846CE7D5-CF57-46EF-B807-FDD0502418D4}" type="datetimeFigureOut">
               <a:rPr lang="en-US" smtClean="0"/>
-              <a:t>11/15/2021</a:t>
+              <a:t>12/1/2021</a:t>
             </a:fld>
             <a:endParaRPr lang="en-US"/>
           </a:p>
@@ -1616,7 +1616,7 @@
           <a:p>
             <a:fld id="{846CE7D5-CF57-46EF-B807-FDD0502418D4}" type="datetimeFigureOut">
               <a:rPr lang="en-US" smtClean="0"/>
-              <a:t>11/15/2021</a:t>
+              <a:t>12/1/2021</a:t>
             </a:fld>
             <a:endParaRPr lang="en-US"/>
           </a:p>
@@ -1734,7 +1734,7 @@
           <a:p>
             <a:fld id="{846CE7D5-CF57-46EF-B807-FDD0502418D4}" type="datetimeFigureOut">
               <a:rPr lang="en-US" smtClean="0"/>
-              <a:t>11/15/2021</a:t>
+              <a:t>12/1/2021</a:t>
             </a:fld>
             <a:endParaRPr lang="en-US"/>
           </a:p>
@@ -1829,7 +1829,7 @@
           <a:p>
             <a:fld id="{846CE7D5-CF57-46EF-B807-FDD0502418D4}" type="datetimeFigureOut">
               <a:rPr lang="en-US" smtClean="0"/>
-              <a:t>11/15/2021</a:t>
+              <a:t>12/1/2021</a:t>
             </a:fld>
             <a:endParaRPr lang="en-US"/>
           </a:p>
@@ -2106,7 +2106,7 @@
           <a:p>
             <a:fld id="{846CE7D5-CF57-46EF-B807-FDD0502418D4}" type="datetimeFigureOut">
               <a:rPr lang="en-US" smtClean="0"/>
-              <a:t>11/15/2021</a:t>
+              <a:t>12/1/2021</a:t>
             </a:fld>
             <a:endParaRPr lang="en-US"/>
           </a:p>
@@ -2363,7 +2363,7 @@
           <a:p>
             <a:fld id="{846CE7D5-CF57-46EF-B807-FDD0502418D4}" type="datetimeFigureOut">
               <a:rPr lang="en-US" smtClean="0"/>
-              <a:t>11/15/2021</a:t>
+              <a:t>12/1/2021</a:t>
             </a:fld>
             <a:endParaRPr lang="en-US"/>
           </a:p>
@@ -2576,7 +2576,7 @@
           <a:p>
             <a:fld id="{846CE7D5-CF57-46EF-B807-FDD0502418D4}" type="datetimeFigureOut">
               <a:rPr lang="en-US" smtClean="0"/>
-              <a:t>11/15/2021</a:t>
+              <a:t>12/1/2021</a:t>
             </a:fld>
             <a:endParaRPr lang="en-US"/>
           </a:p>
@@ -3126,8 +3126,8 @@
         </p:nvSpPr>
         <p:spPr>
           <a:xfrm>
-            <a:off x="3006725" y="2983446"/>
-            <a:ext cx="2743200" cy="338554"/>
+            <a:off x="2982768" y="2975349"/>
+            <a:ext cx="2743200" cy="323165"/>
           </a:xfrm>
           <a:prstGeom prst="rect">
             <a:avLst/>
@@ -3144,10 +3144,10 @@
           <a:lstStyle/>
           <a:p>
             <a:r>
-              <a:rPr lang="en-US" sz="1600" b="1" dirty="0"/>
-              <a:t>Multiple Linear Regression</a:t>
-            </a:r>
-            <a:endParaRPr lang="en-US" sz="1600" dirty="0">
+              <a:rPr lang="en-US" sz="1500" b="1" dirty="0"/>
+              <a:t>Polynomial Linear Regression</a:t>
+            </a:r>
+            <a:endParaRPr lang="en-US" sz="1500" dirty="0">
               <a:cs typeface="Calibri"/>
             </a:endParaRPr>
           </a:p>
@@ -3629,7 +3629,7 @@
         </p:nvSpPr>
         <p:spPr>
           <a:xfrm>
-            <a:off x="9445625" y="2790825"/>
+            <a:off x="9578975" y="2794000"/>
             <a:ext cx="1358900" cy="635000"/>
           </a:xfrm>
           <a:prstGeom prst="roundRect">
@@ -3769,13 +3769,15 @@
               </a:ext>
             </a:extLst>
           </p:cNvPr>
-          <p:cNvCxnSpPr/>
+          <p:cNvCxnSpPr>
+            <a:cxnSpLocks/>
+          </p:cNvCxnSpPr>
           <p:nvPr/>
         </p:nvCxnSpPr>
         <p:spPr>
           <a:xfrm>
-            <a:off x="4238625" y="5608493"/>
-            <a:ext cx="3898900" cy="0"/>
+            <a:off x="4238625" y="5586845"/>
+            <a:ext cx="3851275" cy="0"/>
           </a:xfrm>
           <a:prstGeom prst="straightConnector1">
             <a:avLst/>
@@ -3805,13 +3807,15 @@
               </a:ext>
             </a:extLst>
           </p:cNvPr>
-          <p:cNvCxnSpPr/>
+          <p:cNvCxnSpPr>
+            <a:cxnSpLocks/>
+          </p:cNvCxnSpPr>
           <p:nvPr/>
         </p:nvCxnSpPr>
         <p:spPr>
           <a:xfrm flipV="1">
-            <a:off x="8137525" y="5267325"/>
-            <a:ext cx="12700" cy="330200"/>
+            <a:off x="8071138" y="5248275"/>
+            <a:ext cx="0" cy="338570"/>
           </a:xfrm>
           <a:prstGeom prst="straightConnector1">
             <a:avLst/>
@@ -3924,7 +3928,7 @@
         </p:nvCxnSpPr>
         <p:spPr>
           <a:xfrm flipH="1">
-            <a:off x="8089900" y="4013200"/>
+            <a:off x="8064788" y="4018540"/>
             <a:ext cx="12700" cy="444500"/>
           </a:xfrm>
           <a:prstGeom prst="straightConnector1">
@@ -4141,9 +4145,9 @@
                 <a:ea typeface="+mn-lt"/>
                 <a:cs typeface="+mn-lt"/>
               </a:rPr>
-              <a:t>NYC property sales by borough: 2003-2013</a:t>
-            </a:r>
-            <a:endParaRPr lang="en-US" sz="1400" b="1">
+              <a:t>NYC property sales by borough: 2003-2015</a:t>
+            </a:r>
+            <a:endParaRPr lang="en-US" sz="1400" b="1" dirty="0">
               <a:cs typeface="Calibri"/>
             </a:endParaRPr>
           </a:p>
@@ -4182,14 +4186,132 @@
           <a:p>
             <a:r>
               <a:rPr lang="en-US" sz="1400" b="1" dirty="0"/>
-              <a:t>NYC property sales by borough: 2014-2018</a:t>
-            </a:r>
-            <a:endParaRPr lang="en-US" sz="1400">
+              <a:t>NYC property sales by borough: 2016-2018</a:t>
+            </a:r>
+            <a:endParaRPr lang="en-US" sz="1400" dirty="0">
               <a:cs typeface="Calibri"/>
             </a:endParaRPr>
           </a:p>
         </p:txBody>
       </p:sp>
+      <p:cxnSp>
+        <p:nvCxnSpPr>
+          <p:cNvPr id="27" name="Straight Connector 26">
+            <a:extLst>
+              <a:ext uri="{FF2B5EF4-FFF2-40B4-BE49-F238E27FC236}">
+                <a16:creationId xmlns:a16="http://schemas.microsoft.com/office/drawing/2014/main" id="{D3D65328-3019-41E2-8A67-413726164098}"/>
+              </a:ext>
+            </a:extLst>
+          </p:cNvPr>
+          <p:cNvCxnSpPr>
+            <a:cxnSpLocks/>
+            <a:stCxn id="15" idx="2"/>
+          </p:cNvCxnSpPr>
+          <p:nvPr/>
+        </p:nvCxnSpPr>
+        <p:spPr>
+          <a:xfrm>
+            <a:off x="5737225" y="5248275"/>
+            <a:ext cx="0" cy="956846"/>
+          </a:xfrm>
+          <a:prstGeom prst="line">
+            <a:avLst/>
+          </a:prstGeom>
+        </p:spPr>
+        <p:style>
+          <a:lnRef idx="1">
+            <a:schemeClr val="accent1"/>
+          </a:lnRef>
+          <a:fillRef idx="0">
+            <a:schemeClr val="accent1"/>
+          </a:fillRef>
+          <a:effectRef idx="0">
+            <a:schemeClr val="accent1"/>
+          </a:effectRef>
+          <a:fontRef idx="minor">
+            <a:schemeClr val="tx1"/>
+          </a:fontRef>
+        </p:style>
+      </p:cxnSp>
+      <p:cxnSp>
+        <p:nvCxnSpPr>
+          <p:cNvPr id="39" name="Straight Connector 38">
+            <a:extLst>
+              <a:ext uri="{FF2B5EF4-FFF2-40B4-BE49-F238E27FC236}">
+                <a16:creationId xmlns:a16="http://schemas.microsoft.com/office/drawing/2014/main" id="{6CEEF920-8AE1-428E-9205-F9728C491E67}"/>
+              </a:ext>
+            </a:extLst>
+          </p:cNvPr>
+          <p:cNvCxnSpPr>
+            <a:cxnSpLocks/>
+          </p:cNvCxnSpPr>
+          <p:nvPr/>
+        </p:nvCxnSpPr>
+        <p:spPr>
+          <a:xfrm>
+            <a:off x="5725968" y="6205121"/>
+            <a:ext cx="4618759" cy="0"/>
+          </a:xfrm>
+          <a:prstGeom prst="line">
+            <a:avLst/>
+          </a:prstGeom>
+        </p:spPr>
+        <p:style>
+          <a:lnRef idx="1">
+            <a:schemeClr val="accent1"/>
+          </a:lnRef>
+          <a:fillRef idx="0">
+            <a:schemeClr val="accent1"/>
+          </a:fillRef>
+          <a:effectRef idx="0">
+            <a:schemeClr val="accent1"/>
+          </a:effectRef>
+          <a:fontRef idx="minor">
+            <a:schemeClr val="tx1"/>
+          </a:fontRef>
+        </p:style>
+      </p:cxnSp>
+      <p:cxnSp>
+        <p:nvCxnSpPr>
+          <p:cNvPr id="43" name="Straight Arrow Connector 42">
+            <a:extLst>
+              <a:ext uri="{FF2B5EF4-FFF2-40B4-BE49-F238E27FC236}">
+                <a16:creationId xmlns:a16="http://schemas.microsoft.com/office/drawing/2014/main" id="{CC7A5EEA-F547-4E22-B59F-B7C6C18A6262}"/>
+              </a:ext>
+            </a:extLst>
+          </p:cNvPr>
+          <p:cNvCxnSpPr>
+            <a:cxnSpLocks/>
+          </p:cNvCxnSpPr>
+          <p:nvPr/>
+        </p:nvCxnSpPr>
+        <p:spPr>
+          <a:xfrm flipV="1">
+            <a:off x="10344727" y="5384800"/>
+            <a:ext cx="11257" cy="804446"/>
+          </a:xfrm>
+          <a:prstGeom prst="straightConnector1">
+            <a:avLst/>
+          </a:prstGeom>
+          <a:ln>
+            <a:tailEnd type="triangle"/>
+          </a:ln>
+        </p:spPr>
+        <p:style>
+          <a:lnRef idx="1">
+            <a:schemeClr val="accent1"/>
+          </a:lnRef>
+          <a:fillRef idx="0">
+            <a:schemeClr val="accent1"/>
+          </a:fillRef>
+          <a:effectRef idx="0">
+            <a:schemeClr val="accent1"/>
+          </a:effectRef>
+          <a:fontRef idx="minor">
+            <a:schemeClr val="tx1"/>
+          </a:fontRef>
+        </p:style>
+      </p:cxnSp>
     </p:spTree>
     <p:extLst>
       <p:ext uri="{BB962C8B-B14F-4D97-AF65-F5344CB8AC3E}">

</xml_diff>